<commit_message>
Update headings and figure titles.
</commit_message>
<xml_diff>
--- a/architecture/Appium_Samples_InaBox_Architecture.pptx
+++ b/architecture/Appium_Samples_InaBox_Architecture.pptx
@@ -3145,22 +3145,6 @@
               <a:t>Architecture &amp; Sequence Flow Diagrams</a:t>
             </a:r>
           </a:p>
-          <a:p/>
-          <a:p>
-            <a:r>
-              <a:t>Generated from scripts/run_tests.py</a:t>
-            </a:r>
-          </a:p>
-          <a:p>
-            <a:r>
-              <a:t>Docker Container Integration</a:t>
-            </a:r>
-          </a:p>
-          <a:p>
-            <a:r>
-              <a:t>Digital.ai Testing Cloud Platform</a:t>
-            </a:r>
-          </a:p>
         </p:txBody>
       </p:sp>
     </p:spTree>
@@ -3211,7 +3195,7 @@
               </a:defRPr>
             </a:pPr>
             <a:r>
-              <a:t>System Architecture Overview</a:t>
+              <a:t>Architectural Overview</a:t>
             </a:r>
           </a:p>
         </p:txBody>
@@ -3270,7 +3254,7 @@
               </a:defRPr>
             </a:pPr>
             <a:r>
-              <a:t>Key Components: Test Runner (Python) • Docker Container • Build Tools (Gradle/uv) • Digital.ai Testing Cloud</a:t>
+              <a:t>Key Components: Runner (Python) • Docker Container • Build Tools (Gradle/uv) • Digital.ai Testing Cloud</a:t>
             </a:r>
           </a:p>
         </p:txBody>

</xml_diff>